<commit_message>
Description:     Correct STRCPL property list class label in figure image. Tested:  Firefox
Former-commit-id: d94965e75cabb875fba38150674de4fd840badd8
</commit_message>
<xml_diff>
--- a/html/UG/Images/PropList_Images.pptx
+++ b/html/UG/Images/PropList_Images.pptx
@@ -6,9 +6,8 @@
   </p:sldMasterIdLst>
   <p:sldIdLst>
     <p:sldId id="256" r:id="rId2"/>
-    <p:sldId id="258" r:id="rId3"/>
-    <p:sldId id="259" r:id="rId4"/>
-    <p:sldId id="260" r:id="rId5"/>
+    <p:sldId id="259" r:id="rId3"/>
+    <p:sldId id="260" r:id="rId4"/>
   </p:sldIdLst>
   <p:sldSz cx="9144000" cy="6858000" type="screen4x3"/>
   <p:notesSz cx="6858000" cy="9144000"/>
@@ -291,7 +290,7 @@
           <a:p>
             <a:fld id="{92950DA8-0E95-344A-A408-B194E18889DB}" type="datetimeFigureOut">
               <a:rPr lang="en-US" smtClean="0"/>
-              <a:t>2014/04/08</a:t>
+              <a:t>2014/05/07</a:t>
             </a:fld>
             <a:endParaRPr lang="en-US"/>
           </a:p>
@@ -461,7 +460,7 @@
           <a:p>
             <a:fld id="{92950DA8-0E95-344A-A408-B194E18889DB}" type="datetimeFigureOut">
               <a:rPr lang="en-US" smtClean="0"/>
-              <a:t>2014/04/08</a:t>
+              <a:t>2014/05/07</a:t>
             </a:fld>
             <a:endParaRPr lang="en-US"/>
           </a:p>
@@ -641,7 +640,7 @@
           <a:p>
             <a:fld id="{92950DA8-0E95-344A-A408-B194E18889DB}" type="datetimeFigureOut">
               <a:rPr lang="en-US" smtClean="0"/>
-              <a:t>2014/04/08</a:t>
+              <a:t>2014/05/07</a:t>
             </a:fld>
             <a:endParaRPr lang="en-US"/>
           </a:p>
@@ -811,7 +810,7 @@
           <a:p>
             <a:fld id="{92950DA8-0E95-344A-A408-B194E18889DB}" type="datetimeFigureOut">
               <a:rPr lang="en-US" smtClean="0"/>
-              <a:t>2014/04/08</a:t>
+              <a:t>2014/05/07</a:t>
             </a:fld>
             <a:endParaRPr lang="en-US"/>
           </a:p>
@@ -1057,7 +1056,7 @@
           <a:p>
             <a:fld id="{92950DA8-0E95-344A-A408-B194E18889DB}" type="datetimeFigureOut">
               <a:rPr lang="en-US" smtClean="0"/>
-              <a:t>2014/04/08</a:t>
+              <a:t>2014/05/07</a:t>
             </a:fld>
             <a:endParaRPr lang="en-US"/>
           </a:p>
@@ -1345,7 +1344,7 @@
           <a:p>
             <a:fld id="{92950DA8-0E95-344A-A408-B194E18889DB}" type="datetimeFigureOut">
               <a:rPr lang="en-US" smtClean="0"/>
-              <a:t>2014/04/08</a:t>
+              <a:t>2014/05/07</a:t>
             </a:fld>
             <a:endParaRPr lang="en-US"/>
           </a:p>
@@ -1767,7 +1766,7 @@
           <a:p>
             <a:fld id="{92950DA8-0E95-344A-A408-B194E18889DB}" type="datetimeFigureOut">
               <a:rPr lang="en-US" smtClean="0"/>
-              <a:t>2014/04/08</a:t>
+              <a:t>2014/05/07</a:t>
             </a:fld>
             <a:endParaRPr lang="en-US"/>
           </a:p>
@@ -1885,7 +1884,7 @@
           <a:p>
             <a:fld id="{92950DA8-0E95-344A-A408-B194E18889DB}" type="datetimeFigureOut">
               <a:rPr lang="en-US" smtClean="0"/>
-              <a:t>2014/04/08</a:t>
+              <a:t>2014/05/07</a:t>
             </a:fld>
             <a:endParaRPr lang="en-US"/>
           </a:p>
@@ -1980,7 +1979,7 @@
           <a:p>
             <a:fld id="{92950DA8-0E95-344A-A408-B194E18889DB}" type="datetimeFigureOut">
               <a:rPr lang="en-US" smtClean="0"/>
-              <a:t>2014/04/08</a:t>
+              <a:t>2014/05/07</a:t>
             </a:fld>
             <a:endParaRPr lang="en-US"/>
           </a:p>
@@ -2257,7 +2256,7 @@
           <a:p>
             <a:fld id="{92950DA8-0E95-344A-A408-B194E18889DB}" type="datetimeFigureOut">
               <a:rPr lang="en-US" smtClean="0"/>
-              <a:t>2014/04/08</a:t>
+              <a:t>2014/05/07</a:t>
             </a:fld>
             <a:endParaRPr lang="en-US"/>
           </a:p>
@@ -2510,7 +2509,7 @@
           <a:p>
             <a:fld id="{92950DA8-0E95-344A-A408-B194E18889DB}" type="datetimeFigureOut">
               <a:rPr lang="en-US" smtClean="0"/>
-              <a:t>2014/04/08</a:t>
+              <a:t>2014/05/07</a:t>
             </a:fld>
             <a:endParaRPr lang="en-US"/>
           </a:p>
@@ -2723,7 +2722,7 @@
           <a:p>
             <a:fld id="{92950DA8-0E95-344A-A408-B194E18889DB}" type="datetimeFigureOut">
               <a:rPr lang="en-US" smtClean="0"/>
-              <a:t>2014/04/08</a:t>
+              <a:t>2014/05/07</a:t>
             </a:fld>
             <a:endParaRPr lang="en-US"/>
           </a:p>
@@ -3182,7 +3181,7 @@
         </p:nvSpPr>
         <p:spPr>
           <a:xfrm>
-            <a:off x="2763619" y="945931"/>
+            <a:off x="2772085" y="945931"/>
             <a:ext cx="3529231" cy="369332"/>
           </a:xfrm>
           <a:prstGeom prst="rect">
@@ -3198,10 +3197,18 @@
           <a:p>
             <a:pPr algn="ctr"/>
             <a:r>
-              <a:rPr lang="en-US" dirty="0" smtClean="0"/>
+              <a:rPr lang="en-US" dirty="0" smtClean="0">
+                <a:solidFill>
+                  <a:srgbClr val="7F7F7F"/>
+                </a:solidFill>
+              </a:rPr>
               <a:t>Property List Class Root </a:t>
             </a:r>
-            <a:endParaRPr lang="en-US" dirty="0"/>
+            <a:endParaRPr lang="en-US" dirty="0">
+              <a:solidFill>
+                <a:srgbClr val="7F7F7F"/>
+              </a:solidFill>
+            </a:endParaRPr>
           </a:p>
         </p:txBody>
       </p:sp>
@@ -3635,8 +3642,8 @@
         </p:nvSpPr>
         <p:spPr>
           <a:xfrm>
-            <a:off x="2415873" y="2198283"/>
-            <a:ext cx="633507" cy="369332"/>
+            <a:off x="2330099" y="2198283"/>
+            <a:ext cx="877163" cy="369332"/>
           </a:xfrm>
           <a:prstGeom prst="rect">
             <a:avLst/>
@@ -3650,10 +3657,24 @@
           <a:lstStyle/>
           <a:p>
             <a:r>
-              <a:rPr lang="en-US" dirty="0" smtClean="0"/>
-              <a:t>SCPL</a:t>
-            </a:r>
-            <a:endParaRPr lang="en-US" dirty="0"/>
+              <a:rPr lang="en-US" dirty="0" smtClean="0">
+                <a:solidFill>
+                  <a:schemeClr val="tx1">
+                    <a:lumMod val="50000"/>
+                    <a:lumOff val="50000"/>
+                  </a:schemeClr>
+                </a:solidFill>
+              </a:rPr>
+              <a:t>STRCPL</a:t>
+            </a:r>
+            <a:endParaRPr lang="en-US" dirty="0">
+              <a:solidFill>
+                <a:schemeClr val="tx1">
+                  <a:lumMod val="50000"/>
+                  <a:lumOff val="50000"/>
+                </a:schemeClr>
+              </a:solidFill>
+            </a:endParaRPr>
           </a:p>
         </p:txBody>
       </p:sp>
@@ -3680,10 +3701,18 @@
           <a:lstStyle/>
           <a:p>
             <a:r>
-              <a:rPr lang="en-US" dirty="0" smtClean="0"/>
+              <a:rPr lang="en-US" dirty="0" smtClean="0">
+                <a:solidFill>
+                  <a:srgbClr val="7F7F7F"/>
+                </a:solidFill>
+              </a:rPr>
               <a:t>OCPL</a:t>
             </a:r>
-            <a:endParaRPr lang="en-US" dirty="0"/>
+            <a:endParaRPr lang="en-US" dirty="0">
+              <a:solidFill>
+                <a:srgbClr val="7F7F7F"/>
+              </a:solidFill>
+            </a:endParaRPr>
           </a:p>
         </p:txBody>
       </p:sp>
@@ -3814,9 +3843,9 @@
           <p:nvPr/>
         </p:nvCxnSpPr>
         <p:spPr>
-          <a:xfrm flipV="1">
-            <a:off x="2492649" y="2507504"/>
-            <a:ext cx="453751" cy="6351"/>
+          <a:xfrm>
+            <a:off x="2429968" y="2507259"/>
+            <a:ext cx="659337" cy="0"/>
           </a:xfrm>
           <a:prstGeom prst="line">
             <a:avLst/>
@@ -3946,7 +3975,7 @@
         <p:spPr>
           <a:xfrm flipH="1">
             <a:off x="1480243" y="1288803"/>
-            <a:ext cx="1536008" cy="1819521"/>
+            <a:ext cx="1536008" cy="1743437"/>
           </a:xfrm>
           <a:prstGeom prst="line">
             <a:avLst/>
@@ -4319,1211 +4348,6 @@
           </a:fontRef>
         </p:style>
       </p:cxnSp>
-    </p:spTree>
-    <p:extLst>
-      <p:ext uri="{BB962C8B-B14F-4D97-AF65-F5344CB8AC3E}">
-        <p14:creationId xmlns:p14="http://schemas.microsoft.com/office/powerpoint/2010/main" val="3236410239"/>
-      </p:ext>
-    </p:extLst>
-  </p:cSld>
-  <p:clrMapOvr>
-    <a:masterClrMapping/>
-  </p:clrMapOvr>
-</p:sld>
-</file>
-
-<file path=ppt/slides/slide3.xml><?xml version="1.0" encoding="utf-8"?>
-<p:sld xmlns:a="http://schemas.openxmlformats.org/drawingml/2006/main" xmlns:r="http://schemas.openxmlformats.org/officeDocument/2006/relationships" xmlns:p="http://schemas.openxmlformats.org/presentationml/2006/main">
-  <p:cSld>
-    <p:spTree>
-      <p:nvGrpSpPr>
-        <p:cNvPr id="1" name=""/>
-        <p:cNvGrpSpPr/>
-        <p:nvPr/>
-      </p:nvGrpSpPr>
-      <p:grpSpPr>
-        <a:xfrm>
-          <a:off x="0" y="0"/>
-          <a:ext cx="0" cy="0"/>
-          <a:chOff x="0" y="0"/>
-          <a:chExt cx="0" cy="0"/>
-        </a:xfrm>
-      </p:grpSpPr>
-      <p:sp>
-        <p:nvSpPr>
-          <p:cNvPr id="2" name="TextBox 1"/>
-          <p:cNvSpPr txBox="1"/>
-          <p:nvPr/>
-        </p:nvSpPr>
-        <p:spPr>
-          <a:xfrm>
-            <a:off x="2772085" y="945931"/>
-            <a:ext cx="3529231" cy="369332"/>
-          </a:xfrm>
-          <a:prstGeom prst="rect">
-            <a:avLst/>
-          </a:prstGeom>
-          <a:noFill/>
-        </p:spPr>
-        <p:txBody>
-          <a:bodyPr wrap="square" rtlCol="0">
-            <a:spAutoFit/>
-          </a:bodyPr>
-          <a:lstStyle/>
-          <a:p>
-            <a:pPr algn="ctr"/>
-            <a:r>
-              <a:rPr lang="en-US" dirty="0" smtClean="0">
-                <a:solidFill>
-                  <a:srgbClr val="7F7F7F"/>
-                </a:solidFill>
-              </a:rPr>
-              <a:t>Property List Class Root </a:t>
-            </a:r>
-            <a:endParaRPr lang="en-US" dirty="0">
-              <a:solidFill>
-                <a:srgbClr val="7F7F7F"/>
-              </a:solidFill>
-            </a:endParaRPr>
-          </a:p>
-        </p:txBody>
-      </p:sp>
-      <p:cxnSp>
-        <p:nvCxnSpPr>
-          <p:cNvPr id="4" name="Straight Connector 3"/>
-          <p:cNvCxnSpPr/>
-          <p:nvPr/>
-        </p:nvCxnSpPr>
-        <p:spPr>
-          <a:xfrm>
-            <a:off x="2743934" y="1288803"/>
-            <a:ext cx="3580541" cy="0"/>
-          </a:xfrm>
-          <a:prstGeom prst="line">
-            <a:avLst/>
-          </a:prstGeom>
-          <a:ln/>
-          <a:effectLst/>
-        </p:spPr>
-        <p:style>
-          <a:lnRef idx="2">
-            <a:schemeClr val="accent1"/>
-          </a:lnRef>
-          <a:fillRef idx="0">
-            <a:schemeClr val="accent1"/>
-          </a:fillRef>
-          <a:effectRef idx="1">
-            <a:schemeClr val="accent1"/>
-          </a:effectRef>
-          <a:fontRef idx="minor">
-            <a:schemeClr val="tx1"/>
-          </a:fontRef>
-        </p:style>
-      </p:cxnSp>
-      <p:sp>
-        <p:nvSpPr>
-          <p:cNvPr id="5" name="TextBox 4"/>
-          <p:cNvSpPr txBox="1"/>
-          <p:nvPr/>
-        </p:nvSpPr>
-        <p:spPr>
-          <a:xfrm>
-            <a:off x="515417" y="3030367"/>
-            <a:ext cx="646331" cy="369332"/>
-          </a:xfrm>
-          <a:prstGeom prst="rect">
-            <a:avLst/>
-          </a:prstGeom>
-          <a:noFill/>
-        </p:spPr>
-        <p:txBody>
-          <a:bodyPr wrap="none" rtlCol="0">
-            <a:spAutoFit/>
-          </a:bodyPr>
-          <a:lstStyle/>
-          <a:p>
-            <a:r>
-              <a:rPr lang="en-US" dirty="0" smtClean="0"/>
-              <a:t>FAPL</a:t>
-            </a:r>
-            <a:endParaRPr lang="en-US" dirty="0"/>
-          </a:p>
-        </p:txBody>
-      </p:sp>
-      <p:sp>
-        <p:nvSpPr>
-          <p:cNvPr id="6" name="TextBox 5"/>
-          <p:cNvSpPr txBox="1"/>
-          <p:nvPr/>
-        </p:nvSpPr>
-        <p:spPr>
-          <a:xfrm>
-            <a:off x="1852516" y="3032240"/>
-            <a:ext cx="621083" cy="369332"/>
-          </a:xfrm>
-          <a:prstGeom prst="rect">
-            <a:avLst/>
-          </a:prstGeom>
-          <a:noFill/>
-        </p:spPr>
-        <p:txBody>
-          <a:bodyPr wrap="none" rtlCol="0">
-            <a:spAutoFit/>
-          </a:bodyPr>
-          <a:lstStyle/>
-          <a:p>
-            <a:r>
-              <a:rPr lang="en-US" dirty="0" smtClean="0"/>
-              <a:t>LCPL</a:t>
-            </a:r>
-            <a:endParaRPr lang="en-US" dirty="0"/>
-          </a:p>
-        </p:txBody>
-      </p:sp>
-      <p:sp>
-        <p:nvSpPr>
-          <p:cNvPr id="7" name="TextBox 6"/>
-          <p:cNvSpPr txBox="1"/>
-          <p:nvPr/>
-        </p:nvSpPr>
-        <p:spPr>
-          <a:xfrm>
-            <a:off x="1125017" y="3032240"/>
-            <a:ext cx="710451" cy="369332"/>
-          </a:xfrm>
-          <a:prstGeom prst="rect">
-            <a:avLst/>
-          </a:prstGeom>
-          <a:noFill/>
-        </p:spPr>
-        <p:txBody>
-          <a:bodyPr wrap="none" rtlCol="0">
-            <a:spAutoFit/>
-          </a:bodyPr>
-          <a:lstStyle/>
-          <a:p>
-            <a:r>
-              <a:rPr lang="en-US" dirty="0" smtClean="0"/>
-              <a:t>FMPL</a:t>
-            </a:r>
-            <a:endParaRPr lang="en-US" dirty="0"/>
-          </a:p>
-        </p:txBody>
-      </p:sp>
-      <p:sp>
-        <p:nvSpPr>
-          <p:cNvPr id="8" name="TextBox 7"/>
-          <p:cNvSpPr txBox="1"/>
-          <p:nvPr/>
-        </p:nvSpPr>
-        <p:spPr>
-          <a:xfrm>
-            <a:off x="3141820" y="3032240"/>
-            <a:ext cx="671979" cy="369332"/>
-          </a:xfrm>
-          <a:prstGeom prst="rect">
-            <a:avLst/>
-          </a:prstGeom>
-          <a:noFill/>
-        </p:spPr>
-        <p:txBody>
-          <a:bodyPr wrap="none" rtlCol="0">
-            <a:spAutoFit/>
-          </a:bodyPr>
-          <a:lstStyle/>
-          <a:p>
-            <a:r>
-              <a:rPr lang="en-US" dirty="0" smtClean="0"/>
-              <a:t>GCPL</a:t>
-            </a:r>
-            <a:endParaRPr lang="en-US" dirty="0"/>
-          </a:p>
-        </p:txBody>
-      </p:sp>
-      <p:sp>
-        <p:nvSpPr>
-          <p:cNvPr id="9" name="TextBox 8"/>
-          <p:cNvSpPr txBox="1"/>
-          <p:nvPr/>
-        </p:nvSpPr>
-        <p:spPr>
-          <a:xfrm>
-            <a:off x="2451834" y="3032240"/>
-            <a:ext cx="659155" cy="369332"/>
-          </a:xfrm>
-          <a:prstGeom prst="rect">
-            <a:avLst/>
-          </a:prstGeom>
-          <a:noFill/>
-        </p:spPr>
-        <p:txBody>
-          <a:bodyPr wrap="none" rtlCol="0">
-            <a:spAutoFit/>
-          </a:bodyPr>
-          <a:lstStyle/>
-          <a:p>
-            <a:r>
-              <a:rPr lang="en-US" dirty="0" smtClean="0"/>
-              <a:t>ACPL</a:t>
-            </a:r>
-            <a:endParaRPr lang="en-US" dirty="0"/>
-          </a:p>
-        </p:txBody>
-      </p:sp>
-      <p:sp>
-        <p:nvSpPr>
-          <p:cNvPr id="10" name="TextBox 9"/>
-          <p:cNvSpPr txBox="1"/>
-          <p:nvPr/>
-        </p:nvSpPr>
-        <p:spPr>
-          <a:xfrm>
-            <a:off x="5099396" y="3032240"/>
-            <a:ext cx="915635" cy="369332"/>
-          </a:xfrm>
-          <a:prstGeom prst="rect">
-            <a:avLst/>
-          </a:prstGeom>
-          <a:noFill/>
-        </p:spPr>
-        <p:txBody>
-          <a:bodyPr wrap="none" rtlCol="0">
-            <a:spAutoFit/>
-          </a:bodyPr>
-          <a:lstStyle/>
-          <a:p>
-            <a:r>
-              <a:rPr lang="en-US" dirty="0" smtClean="0"/>
-              <a:t>OCPYPL</a:t>
-            </a:r>
-            <a:endParaRPr lang="en-US" dirty="0"/>
-          </a:p>
-        </p:txBody>
-      </p:sp>
-      <p:sp>
-        <p:nvSpPr>
-          <p:cNvPr id="11" name="TextBox 10"/>
-          <p:cNvSpPr txBox="1"/>
-          <p:nvPr/>
-        </p:nvSpPr>
-        <p:spPr>
-          <a:xfrm>
-            <a:off x="3783109" y="3032240"/>
-            <a:ext cx="671979" cy="369332"/>
-          </a:xfrm>
-          <a:prstGeom prst="rect">
-            <a:avLst/>
-          </a:prstGeom>
-          <a:noFill/>
-        </p:spPr>
-        <p:txBody>
-          <a:bodyPr wrap="none" rtlCol="0">
-            <a:spAutoFit/>
-          </a:bodyPr>
-          <a:lstStyle/>
-          <a:p>
-            <a:r>
-              <a:rPr lang="en-US" dirty="0" smtClean="0"/>
-              <a:t>DCPL</a:t>
-            </a:r>
-            <a:endParaRPr lang="en-US" dirty="0"/>
-          </a:p>
-        </p:txBody>
-      </p:sp>
-      <p:sp>
-        <p:nvSpPr>
-          <p:cNvPr id="12" name="TextBox 11"/>
-          <p:cNvSpPr txBox="1"/>
-          <p:nvPr/>
-        </p:nvSpPr>
-        <p:spPr>
-          <a:xfrm>
-            <a:off x="6032375" y="3032240"/>
-            <a:ext cx="684803" cy="369332"/>
-          </a:xfrm>
-          <a:prstGeom prst="rect">
-            <a:avLst/>
-          </a:prstGeom>
-          <a:noFill/>
-        </p:spPr>
-        <p:txBody>
-          <a:bodyPr wrap="none" rtlCol="0">
-            <a:spAutoFit/>
-          </a:bodyPr>
-          <a:lstStyle/>
-          <a:p>
-            <a:r>
-              <a:rPr lang="en-US" dirty="0" smtClean="0"/>
-              <a:t>GAPL</a:t>
-            </a:r>
-            <a:endParaRPr lang="en-US" dirty="0"/>
-          </a:p>
-        </p:txBody>
-      </p:sp>
-      <p:sp>
-        <p:nvSpPr>
-          <p:cNvPr id="13" name="TextBox 12"/>
-          <p:cNvSpPr txBox="1"/>
-          <p:nvPr/>
-        </p:nvSpPr>
-        <p:spPr>
-          <a:xfrm>
-            <a:off x="4425372" y="3032240"/>
-            <a:ext cx="646331" cy="369332"/>
-          </a:xfrm>
-          <a:prstGeom prst="rect">
-            <a:avLst/>
-          </a:prstGeom>
-          <a:noFill/>
-        </p:spPr>
-        <p:txBody>
-          <a:bodyPr wrap="none" rtlCol="0">
-            <a:spAutoFit/>
-          </a:bodyPr>
-          <a:lstStyle/>
-          <a:p>
-            <a:r>
-              <a:rPr lang="en-US" dirty="0" smtClean="0"/>
-              <a:t>TCPL</a:t>
-            </a:r>
-            <a:endParaRPr lang="en-US" dirty="0"/>
-          </a:p>
-        </p:txBody>
-      </p:sp>
-      <p:sp>
-        <p:nvSpPr>
-          <p:cNvPr id="14" name="TextBox 13"/>
-          <p:cNvSpPr txBox="1"/>
-          <p:nvPr/>
-        </p:nvSpPr>
-        <p:spPr>
-          <a:xfrm>
-            <a:off x="7336629" y="3030367"/>
-            <a:ext cx="646331" cy="369332"/>
-          </a:xfrm>
-          <a:prstGeom prst="rect">
-            <a:avLst/>
-          </a:prstGeom>
-          <a:noFill/>
-        </p:spPr>
-        <p:txBody>
-          <a:bodyPr wrap="none" rtlCol="0">
-            <a:spAutoFit/>
-          </a:bodyPr>
-          <a:lstStyle/>
-          <a:p>
-            <a:r>
-              <a:rPr lang="en-US" dirty="0" smtClean="0"/>
-              <a:t>TAPL</a:t>
-            </a:r>
-            <a:endParaRPr lang="en-US" dirty="0"/>
-          </a:p>
-        </p:txBody>
-      </p:sp>
-      <p:sp>
-        <p:nvSpPr>
-          <p:cNvPr id="15" name="TextBox 14"/>
-          <p:cNvSpPr txBox="1"/>
-          <p:nvPr/>
-        </p:nvSpPr>
-        <p:spPr>
-          <a:xfrm>
-            <a:off x="6681326" y="3030367"/>
-            <a:ext cx="684803" cy="369332"/>
-          </a:xfrm>
-          <a:prstGeom prst="rect">
-            <a:avLst/>
-          </a:prstGeom>
-          <a:noFill/>
-        </p:spPr>
-        <p:txBody>
-          <a:bodyPr wrap="none" rtlCol="0">
-            <a:spAutoFit/>
-          </a:bodyPr>
-          <a:lstStyle/>
-          <a:p>
-            <a:r>
-              <a:rPr lang="en-US" dirty="0" smtClean="0"/>
-              <a:t>DAPL</a:t>
-            </a:r>
-            <a:endParaRPr lang="en-US" dirty="0"/>
-          </a:p>
-        </p:txBody>
-      </p:sp>
-      <p:sp>
-        <p:nvSpPr>
-          <p:cNvPr id="16" name="TextBox 15"/>
-          <p:cNvSpPr txBox="1"/>
-          <p:nvPr/>
-        </p:nvSpPr>
-        <p:spPr>
-          <a:xfrm>
-            <a:off x="7972612" y="3032240"/>
-            <a:ext cx="671979" cy="369332"/>
-          </a:xfrm>
-          <a:prstGeom prst="rect">
-            <a:avLst/>
-          </a:prstGeom>
-          <a:noFill/>
-        </p:spPr>
-        <p:txBody>
-          <a:bodyPr wrap="none" rtlCol="0">
-            <a:spAutoFit/>
-          </a:bodyPr>
-          <a:lstStyle/>
-          <a:p>
-            <a:r>
-              <a:rPr lang="en-US" dirty="0" smtClean="0"/>
-              <a:t>DXPL</a:t>
-            </a:r>
-            <a:endParaRPr lang="en-US" dirty="0"/>
-          </a:p>
-        </p:txBody>
-      </p:sp>
-      <p:sp>
-        <p:nvSpPr>
-          <p:cNvPr id="17" name="TextBox 16"/>
-          <p:cNvSpPr txBox="1"/>
-          <p:nvPr/>
-        </p:nvSpPr>
-        <p:spPr>
-          <a:xfrm>
-            <a:off x="3155285" y="3507732"/>
-            <a:ext cx="646331" cy="369332"/>
-          </a:xfrm>
-          <a:prstGeom prst="rect">
-            <a:avLst/>
-          </a:prstGeom>
-          <a:noFill/>
-        </p:spPr>
-        <p:txBody>
-          <a:bodyPr wrap="none" rtlCol="0">
-            <a:spAutoFit/>
-          </a:bodyPr>
-          <a:lstStyle/>
-          <a:p>
-            <a:r>
-              <a:rPr lang="en-US" dirty="0" smtClean="0"/>
-              <a:t>FCPL</a:t>
-            </a:r>
-            <a:endParaRPr lang="en-US" dirty="0"/>
-          </a:p>
-        </p:txBody>
-      </p:sp>
-      <p:sp>
-        <p:nvSpPr>
-          <p:cNvPr id="18" name="TextBox 17"/>
-          <p:cNvSpPr txBox="1"/>
-          <p:nvPr/>
-        </p:nvSpPr>
-        <p:spPr>
-          <a:xfrm>
-            <a:off x="2415873" y="2198283"/>
-            <a:ext cx="633507" cy="369332"/>
-          </a:xfrm>
-          <a:prstGeom prst="rect">
-            <a:avLst/>
-          </a:prstGeom>
-          <a:noFill/>
-        </p:spPr>
-        <p:txBody>
-          <a:bodyPr wrap="none" rtlCol="0">
-            <a:spAutoFit/>
-          </a:bodyPr>
-          <a:lstStyle/>
-          <a:p>
-            <a:r>
-              <a:rPr lang="en-US" dirty="0" smtClean="0">
-                <a:solidFill>
-                  <a:schemeClr val="tx1">
-                    <a:lumMod val="50000"/>
-                    <a:lumOff val="50000"/>
-                  </a:schemeClr>
-                </a:solidFill>
-              </a:rPr>
-              <a:t>SCPL</a:t>
-            </a:r>
-            <a:endParaRPr lang="en-US" dirty="0">
-              <a:solidFill>
-                <a:schemeClr val="tx1">
-                  <a:lumMod val="50000"/>
-                  <a:lumOff val="50000"/>
-                </a:schemeClr>
-              </a:solidFill>
-            </a:endParaRPr>
-          </a:p>
-        </p:txBody>
-      </p:sp>
-      <p:sp>
-        <p:nvSpPr>
-          <p:cNvPr id="19" name="TextBox 18"/>
-          <p:cNvSpPr txBox="1"/>
-          <p:nvPr/>
-        </p:nvSpPr>
-        <p:spPr>
-          <a:xfrm>
-            <a:off x="3782146" y="2198283"/>
-            <a:ext cx="684803" cy="369332"/>
-          </a:xfrm>
-          <a:prstGeom prst="rect">
-            <a:avLst/>
-          </a:prstGeom>
-          <a:noFill/>
-        </p:spPr>
-        <p:txBody>
-          <a:bodyPr wrap="none" rtlCol="0">
-            <a:spAutoFit/>
-          </a:bodyPr>
-          <a:lstStyle/>
-          <a:p>
-            <a:r>
-              <a:rPr lang="en-US" dirty="0" smtClean="0">
-                <a:solidFill>
-                  <a:srgbClr val="7F7F7F"/>
-                </a:solidFill>
-              </a:rPr>
-              <a:t>OCPL</a:t>
-            </a:r>
-            <a:endParaRPr lang="en-US" dirty="0">
-              <a:solidFill>
-                <a:srgbClr val="7F7F7F"/>
-              </a:solidFill>
-            </a:endParaRPr>
-          </a:p>
-        </p:txBody>
-      </p:sp>
-      <p:sp>
-        <p:nvSpPr>
-          <p:cNvPr id="20" name="TextBox 19"/>
-          <p:cNvSpPr txBox="1"/>
-          <p:nvPr/>
-        </p:nvSpPr>
-        <p:spPr>
-          <a:xfrm>
-            <a:off x="6530289" y="2198283"/>
-            <a:ext cx="760691" cy="369332"/>
-          </a:xfrm>
-          <a:prstGeom prst="rect">
-            <a:avLst/>
-          </a:prstGeom>
-          <a:noFill/>
-        </p:spPr>
-        <p:txBody>
-          <a:bodyPr wrap="square" rtlCol="0">
-            <a:spAutoFit/>
-          </a:bodyPr>
-          <a:lstStyle/>
-          <a:p>
-            <a:r>
-              <a:rPr lang="en-US" dirty="0" smtClean="0"/>
-              <a:t>LAPL</a:t>
-            </a:r>
-            <a:endParaRPr lang="en-US" dirty="0"/>
-          </a:p>
-        </p:txBody>
-      </p:sp>
-      <p:cxnSp>
-        <p:nvCxnSpPr>
-          <p:cNvPr id="22" name="Straight Connector 21"/>
-          <p:cNvCxnSpPr/>
-          <p:nvPr/>
-        </p:nvCxnSpPr>
-        <p:spPr>
-          <a:xfrm flipH="1">
-            <a:off x="2773280" y="1288803"/>
-            <a:ext cx="623970" cy="1006568"/>
-          </a:xfrm>
-          <a:prstGeom prst="line">
-            <a:avLst/>
-          </a:prstGeom>
-        </p:spPr>
-        <p:style>
-          <a:lnRef idx="1">
-            <a:schemeClr val="accent1"/>
-          </a:lnRef>
-          <a:fillRef idx="0">
-            <a:schemeClr val="accent1"/>
-          </a:fillRef>
-          <a:effectRef idx="0">
-            <a:schemeClr val="accent1"/>
-          </a:effectRef>
-          <a:fontRef idx="minor">
-            <a:schemeClr val="tx1"/>
-          </a:fontRef>
-        </p:style>
-      </p:cxnSp>
-      <p:cxnSp>
-        <p:nvCxnSpPr>
-          <p:cNvPr id="23" name="Straight Connector 22"/>
-          <p:cNvCxnSpPr/>
-          <p:nvPr/>
-        </p:nvCxnSpPr>
-        <p:spPr>
-          <a:xfrm>
-            <a:off x="5949950" y="1288803"/>
-            <a:ext cx="873125" cy="1006568"/>
-          </a:xfrm>
-          <a:prstGeom prst="line">
-            <a:avLst/>
-          </a:prstGeom>
-        </p:spPr>
-        <p:style>
-          <a:lnRef idx="1">
-            <a:schemeClr val="accent1"/>
-          </a:lnRef>
-          <a:fillRef idx="0">
-            <a:schemeClr val="accent1"/>
-          </a:fillRef>
-          <a:effectRef idx="0">
-            <a:schemeClr val="accent1"/>
-          </a:effectRef>
-          <a:fontRef idx="minor">
-            <a:schemeClr val="tx1"/>
-          </a:fontRef>
-        </p:style>
-      </p:cxnSp>
-      <p:cxnSp>
-        <p:nvCxnSpPr>
-          <p:cNvPr id="24" name="Straight Connector 23"/>
-          <p:cNvCxnSpPr/>
-          <p:nvPr/>
-        </p:nvCxnSpPr>
-        <p:spPr>
-          <a:xfrm flipH="1">
-            <a:off x="4127500" y="1288803"/>
-            <a:ext cx="36060" cy="1006568"/>
-          </a:xfrm>
-          <a:prstGeom prst="line">
-            <a:avLst/>
-          </a:prstGeom>
-        </p:spPr>
-        <p:style>
-          <a:lnRef idx="1">
-            <a:schemeClr val="accent1"/>
-          </a:lnRef>
-          <a:fillRef idx="0">
-            <a:schemeClr val="accent1"/>
-          </a:fillRef>
-          <a:effectRef idx="0">
-            <a:schemeClr val="accent1"/>
-          </a:effectRef>
-          <a:fontRef idx="minor">
-            <a:schemeClr val="tx1"/>
-          </a:fontRef>
-        </p:style>
-      </p:cxnSp>
-      <p:cxnSp>
-        <p:nvCxnSpPr>
-          <p:cNvPr id="30" name="Straight Connector 29"/>
-          <p:cNvCxnSpPr/>
-          <p:nvPr/>
-        </p:nvCxnSpPr>
-        <p:spPr>
-          <a:xfrm flipV="1">
-            <a:off x="2492649" y="2507504"/>
-            <a:ext cx="453751" cy="6351"/>
-          </a:xfrm>
-          <a:prstGeom prst="line">
-            <a:avLst/>
-          </a:prstGeom>
-          <a:ln/>
-          <a:effectLst/>
-        </p:spPr>
-        <p:style>
-          <a:lnRef idx="2">
-            <a:schemeClr val="accent1"/>
-          </a:lnRef>
-          <a:fillRef idx="0">
-            <a:schemeClr val="accent1"/>
-          </a:fillRef>
-          <a:effectRef idx="1">
-            <a:schemeClr val="accent1"/>
-          </a:effectRef>
-          <a:fontRef idx="minor">
-            <a:schemeClr val="tx1"/>
-          </a:fontRef>
-        </p:style>
-      </p:cxnSp>
-      <p:cxnSp>
-        <p:nvCxnSpPr>
-          <p:cNvPr id="32" name="Straight Connector 31"/>
-          <p:cNvCxnSpPr/>
-          <p:nvPr/>
-        </p:nvCxnSpPr>
-        <p:spPr>
-          <a:xfrm>
-            <a:off x="3879590" y="2506202"/>
-            <a:ext cx="467062" cy="6615"/>
-          </a:xfrm>
-          <a:prstGeom prst="line">
-            <a:avLst/>
-          </a:prstGeom>
-          <a:ln/>
-          <a:effectLst/>
-        </p:spPr>
-        <p:style>
-          <a:lnRef idx="2">
-            <a:schemeClr val="accent1"/>
-          </a:lnRef>
-          <a:fillRef idx="0">
-            <a:schemeClr val="accent1"/>
-          </a:fillRef>
-          <a:effectRef idx="1">
-            <a:schemeClr val="accent1"/>
-          </a:effectRef>
-          <a:fontRef idx="minor">
-            <a:schemeClr val="tx1"/>
-          </a:fontRef>
-        </p:style>
-      </p:cxnSp>
-      <p:cxnSp>
-        <p:nvCxnSpPr>
-          <p:cNvPr id="34" name="Straight Connector 33"/>
-          <p:cNvCxnSpPr/>
-          <p:nvPr/>
-        </p:nvCxnSpPr>
-        <p:spPr>
-          <a:xfrm>
-            <a:off x="6602101" y="2505937"/>
-            <a:ext cx="467062" cy="6615"/>
-          </a:xfrm>
-          <a:prstGeom prst="line">
-            <a:avLst/>
-          </a:prstGeom>
-          <a:ln/>
-          <a:effectLst/>
-        </p:spPr>
-        <p:style>
-          <a:lnRef idx="2">
-            <a:schemeClr val="accent1"/>
-          </a:lnRef>
-          <a:fillRef idx="0">
-            <a:schemeClr val="accent1"/>
-          </a:fillRef>
-          <a:effectRef idx="1">
-            <a:schemeClr val="accent1"/>
-          </a:effectRef>
-          <a:fontRef idx="minor">
-            <a:schemeClr val="tx1"/>
-          </a:fontRef>
-        </p:style>
-      </p:cxnSp>
-      <p:cxnSp>
-        <p:nvCxnSpPr>
-          <p:cNvPr id="35" name="Straight Connector 34"/>
-          <p:cNvCxnSpPr>
-            <a:endCxn id="5" idx="0"/>
-          </p:cNvCxnSpPr>
-          <p:nvPr/>
-        </p:nvCxnSpPr>
-        <p:spPr>
-          <a:xfrm flipH="1">
-            <a:off x="838583" y="1288803"/>
-            <a:ext cx="1987168" cy="1817648"/>
-          </a:xfrm>
-          <a:prstGeom prst="line">
-            <a:avLst/>
-          </a:prstGeom>
-        </p:spPr>
-        <p:style>
-          <a:lnRef idx="1">
-            <a:schemeClr val="accent1"/>
-          </a:lnRef>
-          <a:fillRef idx="0">
-            <a:schemeClr val="accent1"/>
-          </a:fillRef>
-          <a:effectRef idx="0">
-            <a:schemeClr val="accent1"/>
-          </a:effectRef>
-          <a:fontRef idx="minor">
-            <a:schemeClr val="tx1"/>
-          </a:fontRef>
-        </p:style>
-      </p:cxnSp>
-      <p:cxnSp>
-        <p:nvCxnSpPr>
-          <p:cNvPr id="38" name="Straight Connector 37"/>
-          <p:cNvCxnSpPr>
-            <a:endCxn id="7" idx="0"/>
-          </p:cNvCxnSpPr>
-          <p:nvPr/>
-        </p:nvCxnSpPr>
-        <p:spPr>
-          <a:xfrm flipH="1">
-            <a:off x="1480243" y="1288803"/>
-            <a:ext cx="1536008" cy="1743437"/>
-          </a:xfrm>
-          <a:prstGeom prst="line">
-            <a:avLst/>
-          </a:prstGeom>
-        </p:spPr>
-        <p:style>
-          <a:lnRef idx="1">
-            <a:schemeClr val="accent1"/>
-          </a:lnRef>
-          <a:fillRef idx="0">
-            <a:schemeClr val="accent1"/>
-          </a:fillRef>
-          <a:effectRef idx="0">
-            <a:schemeClr val="accent1"/>
-          </a:effectRef>
-          <a:fontRef idx="minor">
-            <a:schemeClr val="tx1"/>
-          </a:fontRef>
-        </p:style>
-      </p:cxnSp>
-      <p:cxnSp>
-        <p:nvCxnSpPr>
-          <p:cNvPr id="43" name="Straight Connector 42"/>
-          <p:cNvCxnSpPr>
-            <a:endCxn id="10" idx="0"/>
-          </p:cNvCxnSpPr>
-          <p:nvPr/>
-        </p:nvCxnSpPr>
-        <p:spPr>
-          <a:xfrm>
-            <a:off x="5248275" y="1288803"/>
-            <a:ext cx="308939" cy="1819521"/>
-          </a:xfrm>
-          <a:prstGeom prst="line">
-            <a:avLst/>
-          </a:prstGeom>
-        </p:spPr>
-        <p:style>
-          <a:lnRef idx="1">
-            <a:schemeClr val="accent1"/>
-          </a:lnRef>
-          <a:fillRef idx="0">
-            <a:schemeClr val="accent1"/>
-          </a:fillRef>
-          <a:effectRef idx="0">
-            <a:schemeClr val="accent1"/>
-          </a:effectRef>
-          <a:fontRef idx="minor">
-            <a:schemeClr val="tx1"/>
-          </a:fontRef>
-        </p:style>
-      </p:cxnSp>
-      <p:cxnSp>
-        <p:nvCxnSpPr>
-          <p:cNvPr id="49" name="Straight Connector 48"/>
-          <p:cNvCxnSpPr>
-            <a:endCxn id="6" idx="0"/>
-          </p:cNvCxnSpPr>
-          <p:nvPr/>
-        </p:nvCxnSpPr>
-        <p:spPr>
-          <a:xfrm flipH="1">
-            <a:off x="2163058" y="2512817"/>
-            <a:ext cx="383294" cy="595507"/>
-          </a:xfrm>
-          <a:prstGeom prst="line">
-            <a:avLst/>
-          </a:prstGeom>
-        </p:spPr>
-        <p:style>
-          <a:lnRef idx="1">
-            <a:schemeClr val="accent1"/>
-          </a:lnRef>
-          <a:fillRef idx="0">
-            <a:schemeClr val="accent1"/>
-          </a:fillRef>
-          <a:effectRef idx="0">
-            <a:schemeClr val="accent1"/>
-          </a:effectRef>
-          <a:fontRef idx="minor">
-            <a:schemeClr val="tx1"/>
-          </a:fontRef>
-        </p:style>
-      </p:cxnSp>
-      <p:cxnSp>
-        <p:nvCxnSpPr>
-          <p:cNvPr id="51" name="Straight Connector 50"/>
-          <p:cNvCxnSpPr>
-            <a:endCxn id="9" idx="0"/>
-          </p:cNvCxnSpPr>
-          <p:nvPr/>
-        </p:nvCxnSpPr>
-        <p:spPr>
-          <a:xfrm flipH="1">
-            <a:off x="2781412" y="2513854"/>
-            <a:ext cx="82550" cy="594470"/>
-          </a:xfrm>
-          <a:prstGeom prst="line">
-            <a:avLst/>
-          </a:prstGeom>
-        </p:spPr>
-        <p:style>
-          <a:lnRef idx="1">
-            <a:schemeClr val="accent1"/>
-          </a:lnRef>
-          <a:fillRef idx="0">
-            <a:schemeClr val="accent1"/>
-          </a:fillRef>
-          <a:effectRef idx="0">
-            <a:schemeClr val="accent1"/>
-          </a:effectRef>
-          <a:fontRef idx="minor">
-            <a:schemeClr val="tx1"/>
-          </a:fontRef>
-        </p:style>
-      </p:cxnSp>
-      <p:cxnSp>
-        <p:nvCxnSpPr>
-          <p:cNvPr id="53" name="Straight Connector 52"/>
-          <p:cNvCxnSpPr>
-            <a:endCxn id="8" idx="0"/>
-          </p:cNvCxnSpPr>
-          <p:nvPr/>
-        </p:nvCxnSpPr>
-        <p:spPr>
-          <a:xfrm flipH="1">
-            <a:off x="3477810" y="2513855"/>
-            <a:ext cx="464762" cy="594469"/>
-          </a:xfrm>
-          <a:prstGeom prst="line">
-            <a:avLst/>
-          </a:prstGeom>
-        </p:spPr>
-        <p:style>
-          <a:lnRef idx="1">
-            <a:schemeClr val="accent1"/>
-          </a:lnRef>
-          <a:fillRef idx="0">
-            <a:schemeClr val="accent1"/>
-          </a:fillRef>
-          <a:effectRef idx="0">
-            <a:schemeClr val="accent1"/>
-          </a:effectRef>
-          <a:fontRef idx="minor">
-            <a:schemeClr val="tx1"/>
-          </a:fontRef>
-        </p:style>
-      </p:cxnSp>
-      <p:cxnSp>
-        <p:nvCxnSpPr>
-          <p:cNvPr id="54" name="Straight Connector 53"/>
-          <p:cNvCxnSpPr>
-            <a:endCxn id="11" idx="0"/>
-          </p:cNvCxnSpPr>
-          <p:nvPr/>
-        </p:nvCxnSpPr>
-        <p:spPr>
-          <a:xfrm flipH="1">
-            <a:off x="4119099" y="2510465"/>
-            <a:ext cx="5450" cy="597859"/>
-          </a:xfrm>
-          <a:prstGeom prst="line">
-            <a:avLst/>
-          </a:prstGeom>
-        </p:spPr>
-        <p:style>
-          <a:lnRef idx="1">
-            <a:schemeClr val="accent1"/>
-          </a:lnRef>
-          <a:fillRef idx="0">
-            <a:schemeClr val="accent1"/>
-          </a:fillRef>
-          <a:effectRef idx="0">
-            <a:schemeClr val="accent1"/>
-          </a:effectRef>
-          <a:fontRef idx="minor">
-            <a:schemeClr val="tx1"/>
-          </a:fontRef>
-        </p:style>
-      </p:cxnSp>
-      <p:cxnSp>
-        <p:nvCxnSpPr>
-          <p:cNvPr id="56" name="Straight Connector 55"/>
-          <p:cNvCxnSpPr>
-            <a:endCxn id="13" idx="0"/>
-          </p:cNvCxnSpPr>
-          <p:nvPr/>
-        </p:nvCxnSpPr>
-        <p:spPr>
-          <a:xfrm>
-            <a:off x="4257334" y="2512817"/>
-            <a:ext cx="491204" cy="595507"/>
-          </a:xfrm>
-          <a:prstGeom prst="line">
-            <a:avLst/>
-          </a:prstGeom>
-        </p:spPr>
-        <p:style>
-          <a:lnRef idx="1">
-            <a:schemeClr val="accent1"/>
-          </a:lnRef>
-          <a:fillRef idx="0">
-            <a:schemeClr val="accent1"/>
-          </a:fillRef>
-          <a:effectRef idx="0">
-            <a:schemeClr val="accent1"/>
-          </a:effectRef>
-          <a:fontRef idx="minor">
-            <a:schemeClr val="tx1"/>
-          </a:fontRef>
-        </p:style>
-      </p:cxnSp>
-      <p:cxnSp>
-        <p:nvCxnSpPr>
-          <p:cNvPr id="62" name="Straight Connector 61"/>
-          <p:cNvCxnSpPr>
-            <a:endCxn id="17" idx="0"/>
-          </p:cNvCxnSpPr>
-          <p:nvPr/>
-        </p:nvCxnSpPr>
-        <p:spPr>
-          <a:xfrm flipH="1">
-            <a:off x="3478451" y="3353805"/>
-            <a:ext cx="652" cy="230769"/>
-          </a:xfrm>
-          <a:prstGeom prst="line">
-            <a:avLst/>
-          </a:prstGeom>
-        </p:spPr>
-        <p:style>
-          <a:lnRef idx="1">
-            <a:schemeClr val="accent1"/>
-          </a:lnRef>
-          <a:fillRef idx="0">
-            <a:schemeClr val="accent1"/>
-          </a:fillRef>
-          <a:effectRef idx="0">
-            <a:schemeClr val="accent1"/>
-          </a:effectRef>
-          <a:fontRef idx="minor">
-            <a:schemeClr val="tx1"/>
-          </a:fontRef>
-        </p:style>
-      </p:cxnSp>
-      <p:cxnSp>
-        <p:nvCxnSpPr>
-          <p:cNvPr id="69" name="Straight Connector 68"/>
-          <p:cNvCxnSpPr>
-            <a:endCxn id="12" idx="0"/>
-          </p:cNvCxnSpPr>
-          <p:nvPr/>
-        </p:nvCxnSpPr>
-        <p:spPr>
-          <a:xfrm flipH="1">
-            <a:off x="6374777" y="2500889"/>
-            <a:ext cx="306550" cy="607435"/>
-          </a:xfrm>
-          <a:prstGeom prst="line">
-            <a:avLst/>
-          </a:prstGeom>
-        </p:spPr>
-        <p:style>
-          <a:lnRef idx="1">
-            <a:schemeClr val="accent1"/>
-          </a:lnRef>
-          <a:fillRef idx="0">
-            <a:schemeClr val="accent1"/>
-          </a:fillRef>
-          <a:effectRef idx="0">
-            <a:schemeClr val="accent1"/>
-          </a:effectRef>
-          <a:fontRef idx="minor">
-            <a:schemeClr val="tx1"/>
-          </a:fontRef>
-        </p:style>
-      </p:cxnSp>
-      <p:cxnSp>
-        <p:nvCxnSpPr>
-          <p:cNvPr id="70" name="Straight Connector 69"/>
-          <p:cNvCxnSpPr>
-            <a:endCxn id="15" idx="0"/>
-          </p:cNvCxnSpPr>
-          <p:nvPr/>
-        </p:nvCxnSpPr>
-        <p:spPr>
-          <a:xfrm>
-            <a:off x="6878885" y="2507290"/>
-            <a:ext cx="144843" cy="599161"/>
-          </a:xfrm>
-          <a:prstGeom prst="line">
-            <a:avLst/>
-          </a:prstGeom>
-        </p:spPr>
-        <p:style>
-          <a:lnRef idx="1">
-            <a:schemeClr val="accent1"/>
-          </a:lnRef>
-          <a:fillRef idx="0">
-            <a:schemeClr val="accent1"/>
-          </a:fillRef>
-          <a:effectRef idx="0">
-            <a:schemeClr val="accent1"/>
-          </a:effectRef>
-          <a:fontRef idx="minor">
-            <a:schemeClr val="tx1"/>
-          </a:fontRef>
-        </p:style>
-      </p:cxnSp>
-      <p:cxnSp>
-        <p:nvCxnSpPr>
-          <p:cNvPr id="71" name="Straight Connector 70"/>
-          <p:cNvCxnSpPr>
-            <a:endCxn id="14" idx="0"/>
-          </p:cNvCxnSpPr>
-          <p:nvPr/>
-        </p:nvCxnSpPr>
-        <p:spPr>
-          <a:xfrm>
-            <a:off x="7023728" y="2507504"/>
-            <a:ext cx="636067" cy="598947"/>
-          </a:xfrm>
-          <a:prstGeom prst="line">
-            <a:avLst/>
-          </a:prstGeom>
-        </p:spPr>
-        <p:style>
-          <a:lnRef idx="1">
-            <a:schemeClr val="accent1"/>
-          </a:lnRef>
-          <a:fillRef idx="0">
-            <a:schemeClr val="accent1"/>
-          </a:fillRef>
-          <a:effectRef idx="0">
-            <a:schemeClr val="accent1"/>
-          </a:effectRef>
-          <a:fontRef idx="minor">
-            <a:schemeClr val="tx1"/>
-          </a:fontRef>
-        </p:style>
-      </p:cxnSp>
-      <p:cxnSp>
-        <p:nvCxnSpPr>
-          <p:cNvPr id="90" name="Straight Connector 89"/>
-          <p:cNvCxnSpPr>
-            <a:endCxn id="16" idx="0"/>
-          </p:cNvCxnSpPr>
-          <p:nvPr/>
-        </p:nvCxnSpPr>
-        <p:spPr>
-          <a:xfrm>
-            <a:off x="6242050" y="1288803"/>
-            <a:ext cx="2066552" cy="1819521"/>
-          </a:xfrm>
-          <a:prstGeom prst="line">
-            <a:avLst/>
-          </a:prstGeom>
-        </p:spPr>
-        <p:style>
-          <a:lnRef idx="1">
-            <a:schemeClr val="accent1"/>
-          </a:lnRef>
-          <a:fillRef idx="0">
-            <a:schemeClr val="accent1"/>
-          </a:fillRef>
-          <a:effectRef idx="0">
-            <a:schemeClr val="accent1"/>
-          </a:effectRef>
-          <a:fontRef idx="minor">
-            <a:schemeClr val="tx1"/>
-          </a:fontRef>
-        </p:style>
-      </p:cxnSp>
       <p:sp>
         <p:nvSpPr>
           <p:cNvPr id="3" name="TextBox 2"/>
@@ -5575,7 +4399,7 @@
 </p:sld>
 </file>
 
-<file path=ppt/slides/slide4.xml><?xml version="1.0" encoding="utf-8"?>
+<file path=ppt/slides/slide3.xml><?xml version="1.0" encoding="utf-8"?>
 <p:sld xmlns:a="http://schemas.openxmlformats.org/drawingml/2006/main" xmlns:r="http://schemas.openxmlformats.org/officeDocument/2006/relationships" xmlns:p="http://schemas.openxmlformats.org/presentationml/2006/main">
   <p:cSld>
     <p:spTree>

</xml_diff>